<commit_message>
Update TOPICS COVERED (updated) (1).pptx
</commit_message>
<xml_diff>
--- a/TOPICS COVERED (updated) (1).pptx
+++ b/TOPICS COVERED (updated) (1).pptx
@@ -3806,7 +3806,20 @@
               </a:rPr>
               <a:t>TOPICS COVERED</a:t>
             </a:r>
-            <a:endParaRPr lang="en-IN" altLang="en-IN" sz="3200" dirty="0">
+            <a:br>
+              <a:rPr lang="en-IN" sz="3200" dirty="0">
+                <a:latin typeface="Agency FB" panose="020B0503020202020204" pitchFamily="34" charset="0"/>
+                <a:sym typeface="+mn-ea"/>
+              </a:rPr>
+            </a:br>
+            <a:r>
+              <a:rPr lang="en-US" altLang="en-IN" sz="3200" dirty="0">
+                <a:latin typeface="Agency FB" panose="020B0503020202020204" pitchFamily="34" charset="0"/>
+                <a:sym typeface="+mn-ea"/>
+              </a:rPr>
+              <a:t>TEst 1</a:t>
+            </a:r>
+            <a:endParaRPr lang="en-US" altLang="en-IN" sz="3200" dirty="0">
               <a:latin typeface="Agency FB" panose="020B0503020202020204" pitchFamily="34" charset="0"/>
               <a:sym typeface="+mn-ea"/>
             </a:endParaRPr>

</xml_diff>